<commit_message>
add arrow figures for slideshow
</commit_message>
<xml_diff>
--- a/pages/figs/ddpcr.pptx
+++ b/pages/figs/ddpcr.pptx
@@ -302,7 +302,7 @@
           <a:p>
             <a:fld id="{3EA3A3A7-1F67-9A4A-B8E5-E029D492957D}" type="datetimeFigureOut">
               <a:rPr lang="en-US" smtClean="0"/>
-              <a:t>6/12/18</a:t>
+              <a:t>6/13/18</a:t>
             </a:fld>
             <a:endParaRPr lang="en-US"/>
           </a:p>
@@ -472,7 +472,7 @@
           <a:p>
             <a:fld id="{3EA3A3A7-1F67-9A4A-B8E5-E029D492957D}" type="datetimeFigureOut">
               <a:rPr lang="en-US" smtClean="0"/>
-              <a:t>6/12/18</a:t>
+              <a:t>6/13/18</a:t>
             </a:fld>
             <a:endParaRPr lang="en-US"/>
           </a:p>
@@ -652,7 +652,7 @@
           <a:p>
             <a:fld id="{3EA3A3A7-1F67-9A4A-B8E5-E029D492957D}" type="datetimeFigureOut">
               <a:rPr lang="en-US" smtClean="0"/>
-              <a:t>6/12/18</a:t>
+              <a:t>6/13/18</a:t>
             </a:fld>
             <a:endParaRPr lang="en-US"/>
           </a:p>
@@ -822,7 +822,7 @@
           <a:p>
             <a:fld id="{3EA3A3A7-1F67-9A4A-B8E5-E029D492957D}" type="datetimeFigureOut">
               <a:rPr lang="en-US" smtClean="0"/>
-              <a:t>6/12/18</a:t>
+              <a:t>6/13/18</a:t>
             </a:fld>
             <a:endParaRPr lang="en-US"/>
           </a:p>
@@ -1068,7 +1068,7 @@
           <a:p>
             <a:fld id="{3EA3A3A7-1F67-9A4A-B8E5-E029D492957D}" type="datetimeFigureOut">
               <a:rPr lang="en-US" smtClean="0"/>
-              <a:t>6/12/18</a:t>
+              <a:t>6/13/18</a:t>
             </a:fld>
             <a:endParaRPr lang="en-US"/>
           </a:p>
@@ -1356,7 +1356,7 @@
           <a:p>
             <a:fld id="{3EA3A3A7-1F67-9A4A-B8E5-E029D492957D}" type="datetimeFigureOut">
               <a:rPr lang="en-US" smtClean="0"/>
-              <a:t>6/12/18</a:t>
+              <a:t>6/13/18</a:t>
             </a:fld>
             <a:endParaRPr lang="en-US"/>
           </a:p>
@@ -1778,7 +1778,7 @@
           <a:p>
             <a:fld id="{3EA3A3A7-1F67-9A4A-B8E5-E029D492957D}" type="datetimeFigureOut">
               <a:rPr lang="en-US" smtClean="0"/>
-              <a:t>6/12/18</a:t>
+              <a:t>6/13/18</a:t>
             </a:fld>
             <a:endParaRPr lang="en-US"/>
           </a:p>
@@ -1896,7 +1896,7 @@
           <a:p>
             <a:fld id="{3EA3A3A7-1F67-9A4A-B8E5-E029D492957D}" type="datetimeFigureOut">
               <a:rPr lang="en-US" smtClean="0"/>
-              <a:t>6/12/18</a:t>
+              <a:t>6/13/18</a:t>
             </a:fld>
             <a:endParaRPr lang="en-US"/>
           </a:p>
@@ -1991,7 +1991,7 @@
           <a:p>
             <a:fld id="{3EA3A3A7-1F67-9A4A-B8E5-E029D492957D}" type="datetimeFigureOut">
               <a:rPr lang="en-US" smtClean="0"/>
-              <a:t>6/12/18</a:t>
+              <a:t>6/13/18</a:t>
             </a:fld>
             <a:endParaRPr lang="en-US"/>
           </a:p>
@@ -2268,7 +2268,7 @@
           <a:p>
             <a:fld id="{3EA3A3A7-1F67-9A4A-B8E5-E029D492957D}" type="datetimeFigureOut">
               <a:rPr lang="en-US" smtClean="0"/>
-              <a:t>6/12/18</a:t>
+              <a:t>6/13/18</a:t>
             </a:fld>
             <a:endParaRPr lang="en-US"/>
           </a:p>
@@ -2521,7 +2521,7 @@
           <a:p>
             <a:fld id="{3EA3A3A7-1F67-9A4A-B8E5-E029D492957D}" type="datetimeFigureOut">
               <a:rPr lang="en-US" smtClean="0"/>
-              <a:t>6/12/18</a:t>
+              <a:t>6/13/18</a:t>
             </a:fld>
             <a:endParaRPr lang="en-US"/>
           </a:p>
@@ -2732,7 +2732,7 @@
           <a:p>
             <a:fld id="{3EA3A3A7-1F67-9A4A-B8E5-E029D492957D}" type="datetimeFigureOut">
               <a:rPr lang="en-US" smtClean="0"/>
-              <a:t>6/12/18</a:t>
+              <a:t>6/13/18</a:t>
             </a:fld>
             <a:endParaRPr lang="en-US"/>
           </a:p>
@@ -3121,8 +3121,8 @@
         </p:nvSpPr>
         <p:spPr>
           <a:xfrm>
-            <a:off x="72168" y="59380"/>
-            <a:ext cx="7297960" cy="707886"/>
+            <a:off x="-1" y="59380"/>
+            <a:ext cx="10799763" cy="707886"/>
           </a:xfrm>
           <a:prstGeom prst="rect">
             <a:avLst/>
@@ -3130,17 +3130,19 @@
           <a:noFill/>
         </p:spPr>
         <p:txBody>
-          <a:bodyPr wrap="none" rtlCol="0">
+          <a:bodyPr wrap="square" rtlCol="0">
             <a:spAutoFit/>
           </a:bodyPr>
           <a:lstStyle/>
           <a:p>
+            <a:pPr algn="ctr"/>
             <a:r>
               <a:rPr lang="en-US" sz="2000" b="1" dirty="0"/>
               <a:t>Model-Based Classification for Digital PCR: Your Umbrella for Rain. </a:t>
             </a:r>
           </a:p>
           <a:p>
+            <a:pPr algn="ctr"/>
             <a:r>
               <a:rPr lang="en-US" sz="2000" b="1" dirty="0"/>
               <a:t>Analytical Chemistry 2017 89(8): 4461-4467</a:t>
@@ -3170,7 +3172,7 @@
         </p:blipFill>
         <p:spPr>
           <a:xfrm>
-            <a:off x="1132495" y="683191"/>
+            <a:off x="1112646" y="692522"/>
             <a:ext cx="8574468" cy="4617021"/>
           </a:xfrm>
           <a:prstGeom prst="rect">

</xml_diff>